<commit_message>
Minor updates to W1 Slides
</commit_message>
<xml_diff>
--- a/Documents/Week 1/EnterpriseJava1.pptx
+++ b/Documents/Week 1/EnterpriseJava1.pptx
@@ -19,10 +19,10 @@
     <p:sldId id="320" r:id="rId7"/>
     <p:sldId id="321" r:id="rId8"/>
     <p:sldId id="319" r:id="rId9"/>
-    <p:sldId id="347" r:id="rId10"/>
-    <p:sldId id="323" r:id="rId11"/>
-    <p:sldId id="324" r:id="rId12"/>
-    <p:sldId id="325" r:id="rId13"/>
+    <p:sldId id="323" r:id="rId10"/>
+    <p:sldId id="324" r:id="rId11"/>
+    <p:sldId id="325" r:id="rId12"/>
+    <p:sldId id="347" r:id="rId13"/>
     <p:sldId id="346" r:id="rId14"/>
     <p:sldId id="327" r:id="rId15"/>
     <p:sldId id="328" r:id="rId16"/>
@@ -224,6 +224,7 @@
           <a:p>
             <a:fld id="{E613903A-B8B5-4602-B0B5-8C472DB8A55D}" type="datetimeFigureOut">
               <a:rPr lang="en-US" smtClean="0"/>
+              <a:pPr/>
               <a:t>2/26/2014</a:t>
             </a:fld>
             <a:endParaRPr lang="en-NZ"/>
@@ -290,6 +291,7 @@
           <a:p>
             <a:fld id="{C326E040-DADD-4441-A94F-F7D8FA5B71BC}" type="slidenum">
               <a:rPr lang="en-NZ" smtClean="0"/>
+              <a:pPr/>
               <a:t>‹#›</a:t>
             </a:fld>
             <a:endParaRPr lang="en-NZ"/>
@@ -299,7 +301,7 @@
     </p:spTree>
     <p:extLst>
       <p:ext uri="{BB962C8B-B14F-4D97-AF65-F5344CB8AC3E}">
-        <p14:creationId xmlns:p14="http://schemas.microsoft.com/office/powerpoint/2010/main" val="2781077519"/>
+        <p14:creationId xmlns:p14="http://schemas.microsoft.com/office/powerpoint/2010/main" xmlns="" val="2781077519"/>
       </p:ext>
     </p:extLst>
   </p:cSld>
@@ -570,7 +572,7 @@
     </p:spTree>
     <p:extLst>
       <p:ext uri="{BB962C8B-B14F-4D97-AF65-F5344CB8AC3E}">
-        <p14:creationId xmlns:p14="http://schemas.microsoft.com/office/powerpoint/2010/main" val="3228770503"/>
+        <p14:creationId xmlns:p14="http://schemas.microsoft.com/office/powerpoint/2010/main" xmlns="" val="3228770503"/>
       </p:ext>
     </p:extLst>
   </p:cSld>
@@ -3952,7 +3954,12 @@
             <a:extLst/>
           </a:lstStyle>
           <a:p>
-            <a:endParaRPr lang="en-US"/>
+            <a:pPr algn="l"/>
+            <a:r>
+              <a:rPr lang="en-US" dirty="0" smtClean="0"/>
+              <a:t>John Casey</a:t>
+            </a:r>
+            <a:endParaRPr lang="en-US" dirty="0"/>
           </a:p>
         </p:txBody>
       </p:sp>
@@ -4749,7 +4756,11 @@
             <a:extLst/>
           </a:lstStyle>
           <a:p>
-            <a:endParaRPr lang="en-US"/>
+            <a:r>
+              <a:rPr lang="en-US" smtClean="0"/>
+              <a:t>John Casey</a:t>
+            </a:r>
+            <a:endParaRPr lang="en-US" dirty="0"/>
           </a:p>
         </p:txBody>
       </p:sp>
@@ -6250,12 +6261,11 @@
             <a:extLst/>
           </a:lstStyle>
           <a:p>
-            <a:pPr algn="r"/>
-            <a:endParaRPr lang="en-US" sz="1400" dirty="0">
-              <a:solidFill>
-                <a:schemeClr val="tx2"/>
-              </a:solidFill>
-            </a:endParaRPr>
+            <a:r>
+              <a:rPr lang="en-US" smtClean="0"/>
+              <a:t>John Casey</a:t>
+            </a:r>
+            <a:endParaRPr lang="en-US" dirty="0"/>
           </a:p>
         </p:txBody>
       </p:sp>
@@ -6967,70 +6977,54 @@
         </p:nvSpPr>
         <p:spPr/>
         <p:txBody>
-          <a:bodyPr>
-            <a:normAutofit fontScale="92500" lnSpcReduction="10000"/>
-          </a:bodyPr>
+          <a:bodyPr/>
           <a:lstStyle/>
           <a:p>
             <a:r>
               <a:rPr lang="en-NZ" dirty="0" smtClean="0"/>
-              <a:t>Java Server Faces</a:t>
+              <a:t>Spring Framework</a:t>
             </a:r>
           </a:p>
           <a:p>
             <a:pPr lvl="1"/>
             <a:r>
               <a:rPr lang="en-NZ" dirty="0" smtClean="0"/>
-              <a:t>Another Model View Controller framework</a:t>
+              <a:t>Acts as a router for different system components</a:t>
             </a:r>
           </a:p>
           <a:p>
             <a:pPr lvl="1"/>
             <a:r>
               <a:rPr lang="en-NZ" dirty="0" smtClean="0"/>
-              <a:t>Component based and event oriented</a:t>
+              <a:t>Looks at class / method properties using Java Reflection</a:t>
             </a:r>
           </a:p>
           <a:p>
             <a:pPr lvl="1"/>
             <a:r>
               <a:rPr lang="en-NZ" dirty="0" smtClean="0"/>
-              <a:t>Uses </a:t>
-            </a:r>
-            <a:r>
-              <a:rPr lang="en-NZ" dirty="0" err="1" smtClean="0"/>
-              <a:t>Facelets</a:t>
-            </a:r>
-            <a:r>
-              <a:rPr lang="en-NZ" dirty="0" smtClean="0"/>
-              <a:t> which is another presentation tech (similar to JSP)</a:t>
-            </a:r>
-          </a:p>
-          <a:p>
-            <a:r>
-              <a:rPr lang="en-NZ" dirty="0" smtClean="0"/>
-              <a:t>Hibernate</a:t>
+              <a:t>Objects bound at runtime instead of at compile time</a:t>
+            </a:r>
+          </a:p>
+          <a:p>
+            <a:pPr lvl="2"/>
+            <a:r>
+              <a:rPr lang="en-NZ" dirty="0" smtClean="0"/>
+              <a:t>Allows system components to be swapped</a:t>
+            </a:r>
+          </a:p>
+          <a:p>
+            <a:pPr lvl="2"/>
+            <a:r>
+              <a:rPr lang="en-NZ" dirty="0" smtClean="0"/>
+              <a:t>Allows testing using mock objects</a:t>
             </a:r>
           </a:p>
           <a:p>
             <a:pPr lvl="1"/>
             <a:r>
               <a:rPr lang="en-NZ" dirty="0" smtClean="0"/>
-              <a:t>Object-Relational Mapping between code and database</a:t>
-            </a:r>
-          </a:p>
-          <a:p>
-            <a:pPr lvl="1"/>
-            <a:r>
-              <a:rPr lang="en-NZ" dirty="0" smtClean="0"/>
-              <a:t>Auto generates code and database mappings based on either class files or database schema</a:t>
-            </a:r>
-          </a:p>
-          <a:p>
-            <a:pPr lvl="1"/>
-            <a:r>
-              <a:rPr lang="en-NZ" dirty="0" smtClean="0"/>
-              <a:t>Saves lots of time as you do not have to embed SQL in your application</a:t>
+              <a:t>Handles transactions and data access layer</a:t>
             </a:r>
           </a:p>
           <a:p>
@@ -7106,55 +7100,89 @@
         </p:nvSpPr>
         <p:spPr/>
         <p:txBody>
-          <a:bodyPr/>
+          <a:bodyPr>
+            <a:normAutofit fontScale="92500" lnSpcReduction="10000"/>
+          </a:bodyPr>
           <a:lstStyle/>
           <a:p>
             <a:r>
               <a:rPr lang="en-NZ" dirty="0" smtClean="0"/>
-              <a:t>Spring Framework</a:t>
+              <a:t>Socket Programming</a:t>
             </a:r>
           </a:p>
           <a:p>
             <a:pPr lvl="1"/>
             <a:r>
               <a:rPr lang="en-NZ" dirty="0" smtClean="0"/>
-              <a:t>Acts as a router for different system components</a:t>
+              <a:t>Synchronous and Asynchronous Sockets</a:t>
+            </a:r>
+          </a:p>
+          <a:p>
+            <a:r>
+              <a:rPr lang="en-NZ" dirty="0" smtClean="0"/>
+              <a:t>Java Enterprise Edition</a:t>
             </a:r>
           </a:p>
           <a:p>
             <a:pPr lvl="1"/>
             <a:r>
               <a:rPr lang="en-NZ" dirty="0" smtClean="0"/>
-              <a:t>Looks at class / method properties using Java Reflection</a:t>
-            </a:r>
+              <a:t>Servers like </a:t>
+            </a:r>
+            <a:r>
+              <a:rPr lang="en-NZ" dirty="0" err="1" smtClean="0"/>
+              <a:t>Jboss</a:t>
+            </a:r>
+            <a:endParaRPr lang="en-NZ" dirty="0" smtClean="0"/>
           </a:p>
           <a:p>
             <a:pPr lvl="1"/>
             <a:r>
               <a:rPr lang="en-NZ" dirty="0" smtClean="0"/>
-              <a:t>Objects bound at runtime instead of at compile time</a:t>
-            </a:r>
-          </a:p>
-          <a:p>
-            <a:pPr lvl="2"/>
-            <a:r>
-              <a:rPr lang="en-NZ" dirty="0" smtClean="0"/>
-              <a:t>Allows system components to be swapped</a:t>
-            </a:r>
-          </a:p>
-          <a:p>
-            <a:pPr lvl="2"/>
-            <a:r>
-              <a:rPr lang="en-NZ" dirty="0" smtClean="0"/>
-              <a:t>Allows testing using mock objects</a:t>
+              <a:t>Java Beans</a:t>
+            </a:r>
+          </a:p>
+          <a:p>
+            <a:r>
+              <a:rPr lang="en-NZ" dirty="0" smtClean="0"/>
+              <a:t>Mule – Enterprise Service Bus</a:t>
             </a:r>
           </a:p>
           <a:p>
             <a:pPr lvl="1"/>
             <a:r>
               <a:rPr lang="en-NZ" dirty="0" smtClean="0"/>
-              <a:t>Handles transactions and data access layer</a:t>
-            </a:r>
+              <a:t>Event-driven batching system</a:t>
+            </a:r>
+          </a:p>
+          <a:p>
+            <a:r>
+              <a:rPr lang="en-NZ" dirty="0" smtClean="0"/>
+              <a:t>Reports</a:t>
+            </a:r>
+          </a:p>
+          <a:p>
+            <a:pPr lvl="1"/>
+            <a:r>
+              <a:rPr lang="en-NZ" dirty="0" smtClean="0"/>
+              <a:t>BIRT</a:t>
+            </a:r>
+          </a:p>
+          <a:p>
+            <a:pPr lvl="1"/>
+            <a:r>
+              <a:rPr lang="en-NZ" dirty="0" smtClean="0"/>
+              <a:t>Jasper Reports</a:t>
+            </a:r>
+          </a:p>
+          <a:p>
+            <a:endParaRPr lang="en-NZ" dirty="0" smtClean="0"/>
+          </a:p>
+          <a:p>
+            <a:pPr>
+              <a:buNone/>
+            </a:pPr>
+            <a:endParaRPr lang="en-NZ" dirty="0" smtClean="0"/>
           </a:p>
           <a:p>
             <a:pPr lvl="1"/>
@@ -7211,7 +7239,7 @@
           <a:p>
             <a:r>
               <a:rPr lang="en-NZ" dirty="0" smtClean="0"/>
-              <a:t>Technologies</a:t>
+              <a:t>Assessments</a:t>
             </a:r>
             <a:endParaRPr lang="en-NZ" dirty="0"/>
           </a:p>
@@ -7230,92 +7258,59 @@
         <p:spPr/>
         <p:txBody>
           <a:bodyPr>
-            <a:normAutofit fontScale="92500" lnSpcReduction="10000"/>
+            <a:normAutofit/>
           </a:bodyPr>
           <a:lstStyle/>
           <a:p>
             <a:r>
               <a:rPr lang="en-NZ" dirty="0" smtClean="0"/>
-              <a:t>Socket Programming</a:t>
+              <a:t>Lab Exercises: 30%</a:t>
             </a:r>
           </a:p>
           <a:p>
             <a:pPr lvl="1"/>
             <a:r>
               <a:rPr lang="en-NZ" dirty="0" smtClean="0"/>
-              <a:t>Synchronous and Asynchronous Sockets</a:t>
-            </a:r>
-          </a:p>
-          <a:p>
-            <a:r>
-              <a:rPr lang="en-NZ" dirty="0" smtClean="0"/>
-              <a:t>Java Enterprise Edition</a:t>
+              <a:t>In class practical exercises due every week, can be submitted by email up to one week late.</a:t>
+            </a:r>
+          </a:p>
+          <a:p>
+            <a:r>
+              <a:rPr lang="en-NZ" dirty="0" smtClean="0"/>
+              <a:t>Assignment</a:t>
+            </a:r>
+            <a:r>
+              <a:rPr lang="en-NZ" dirty="0" smtClean="0"/>
+              <a:t>: </a:t>
+            </a:r>
+            <a:r>
+              <a:rPr lang="en-NZ" dirty="0" smtClean="0"/>
+              <a:t>45</a:t>
+            </a:r>
+            <a:r>
+              <a:rPr lang="en-NZ" dirty="0" smtClean="0"/>
+              <a:t>%</a:t>
             </a:r>
           </a:p>
           <a:p>
             <a:pPr lvl="1"/>
             <a:r>
               <a:rPr lang="en-NZ" dirty="0" smtClean="0"/>
-              <a:t>Servers like </a:t>
-            </a:r>
-            <a:r>
-              <a:rPr lang="en-NZ" dirty="0" err="1" smtClean="0"/>
-              <a:t>Jboss</a:t>
-            </a:r>
-            <a:endParaRPr lang="en-NZ" dirty="0" smtClean="0"/>
+              <a:t>Two major assignments</a:t>
+            </a:r>
+          </a:p>
+          <a:p>
+            <a:r>
+              <a:rPr lang="en-NZ" dirty="0" smtClean="0"/>
+              <a:t>Final exam: 25%</a:t>
+            </a:r>
           </a:p>
           <a:p>
             <a:pPr lvl="1"/>
             <a:r>
               <a:rPr lang="en-NZ" dirty="0" smtClean="0"/>
-              <a:t>Java Beans</a:t>
-            </a:r>
-          </a:p>
-          <a:p>
-            <a:r>
-              <a:rPr lang="en-NZ" dirty="0" smtClean="0"/>
-              <a:t>Mule – Enterprise Service Bus</a:t>
-            </a:r>
-          </a:p>
-          <a:p>
-            <a:pPr lvl="1"/>
-            <a:r>
-              <a:rPr lang="en-NZ" dirty="0" smtClean="0"/>
-              <a:t>Event-driven batching system</a:t>
-            </a:r>
-          </a:p>
-          <a:p>
-            <a:r>
-              <a:rPr lang="en-NZ" dirty="0" smtClean="0"/>
-              <a:t>Reports</a:t>
-            </a:r>
-          </a:p>
-          <a:p>
-            <a:pPr lvl="1"/>
-            <a:r>
-              <a:rPr lang="en-NZ" dirty="0" smtClean="0"/>
-              <a:t>BIRT</a:t>
-            </a:r>
-          </a:p>
-          <a:p>
-            <a:pPr lvl="1"/>
-            <a:r>
-              <a:rPr lang="en-NZ" dirty="0" smtClean="0"/>
-              <a:t>Jasper Reports</a:t>
-            </a:r>
-          </a:p>
-          <a:p>
-            <a:endParaRPr lang="en-NZ" dirty="0" smtClean="0"/>
-          </a:p>
-          <a:p>
-            <a:pPr>
-              <a:buNone/>
-            </a:pPr>
-            <a:endParaRPr lang="en-NZ" dirty="0" smtClean="0"/>
-          </a:p>
-          <a:p>
-            <a:pPr lvl="1"/>
-            <a:endParaRPr lang="en-NZ" dirty="0"/>
+              <a:t>Code and theory</a:t>
+            </a:r>
           </a:p>
         </p:txBody>
       </p:sp>
@@ -7324,13 +7319,6 @@
   <p:clrMapOvr>
     <a:masterClrMapping/>
   </p:clrMapOvr>
-  <p:timing>
-    <p:tnLst>
-      <p:par>
-        <p:cTn id="1" dur="indefinite" restart="never" nodeType="tmRoot"/>
-      </p:par>
-    </p:tnLst>
-  </p:timing>
 </p:sld>
 </file>
 
@@ -7746,12 +7734,7 @@
             <p:ph sz="quarter" idx="13"/>
           </p:nvPr>
         </p:nvSpPr>
-        <p:spPr>
-          <a:xfrm>
-            <a:off x="609600" y="1803400"/>
-            <a:ext cx="8153400" cy="5054600"/>
-          </a:xfrm>
-        </p:spPr>
+        <p:spPr/>
         <p:txBody>
           <a:bodyPr>
             <a:noAutofit/>
@@ -10971,8 +10954,8 @@
         </p:nvSpPr>
         <p:spPr>
           <a:xfrm>
-            <a:off x="609600" y="3286124"/>
-            <a:ext cx="8153400" cy="2886076"/>
+            <a:off x="609600" y="3284984"/>
+            <a:ext cx="8153400" cy="2887216"/>
           </a:xfrm>
         </p:spPr>
         <p:txBody>
@@ -11775,6 +11758,32 @@
           </a:p>
         </p:txBody>
       </p:sp>
+      <p:pic>
+        <p:nvPicPr>
+          <p:cNvPr id="1026" name="Picture 2" descr="C:\Users\JCASEY\Downloads\10135_157205102274_5205428_n.jpg"/>
+          <p:cNvPicPr>
+            <a:picLocks noChangeAspect="1" noChangeArrowheads="1"/>
+          </p:cNvPicPr>
+          <p:nvPr/>
+        </p:nvPicPr>
+        <p:blipFill>
+          <a:blip r:embed="rId4" cstate="print"/>
+          <a:srcRect l="20030"/>
+          <a:stretch>
+            <a:fillRect/>
+          </a:stretch>
+        </p:blipFill>
+        <p:spPr bwMode="auto">
+          <a:xfrm>
+            <a:off x="6660232" y="1844824"/>
+            <a:ext cx="2299935" cy="1942728"/>
+          </a:xfrm>
+          <a:prstGeom prst="rect">
+            <a:avLst/>
+          </a:prstGeom>
+          <a:noFill/>
+        </p:spPr>
+      </p:pic>
     </p:spTree>
   </p:cSld>
   <p:clrMapOvr>
@@ -12209,7 +12218,9 @@
         </p:nvSpPr>
         <p:spPr/>
         <p:txBody>
-          <a:bodyPr/>
+          <a:bodyPr>
+            <a:normAutofit fontScale="85000" lnSpcReduction="10000"/>
+          </a:bodyPr>
           <a:lstStyle/>
           <a:p>
             <a:r>
@@ -12227,19 +12238,54 @@
             <a:pPr lvl="1"/>
             <a:r>
               <a:rPr lang="en-NZ" dirty="0" smtClean="0"/>
-              <a:t>Academic Programmer</a:t>
-            </a:r>
-            <a:endParaRPr lang="en-NZ" dirty="0"/>
+              <a:t>P2P, Sockets, Distributed Systems, Information Retrieval</a:t>
+            </a:r>
           </a:p>
           <a:p>
             <a:pPr lvl="1"/>
             <a:r>
               <a:rPr lang="en-NZ" dirty="0" smtClean="0"/>
-              <a:t>Business </a:t>
-            </a:r>
-            <a:r>
-              <a:rPr lang="en-NZ" dirty="0"/>
-              <a:t>Programmer</a:t>
+              <a:t>Motor Registry System – State of Tasmania</a:t>
+            </a:r>
+          </a:p>
+          <a:p>
+            <a:pPr lvl="1"/>
+            <a:r>
+              <a:rPr lang="en-NZ" dirty="0" smtClean="0"/>
+              <a:t>Fines and Infringement Notices </a:t>
+            </a:r>
+            <a:r>
+              <a:rPr lang="en-NZ" dirty="0" smtClean="0"/>
+              <a:t>Database – State of Tasmania</a:t>
+            </a:r>
+          </a:p>
+          <a:p>
+            <a:pPr lvl="1"/>
+            <a:r>
+              <a:rPr lang="en-NZ" dirty="0" err="1" smtClean="0"/>
+              <a:t>PayGlobal</a:t>
+            </a:r>
+            <a:r>
+              <a:rPr lang="en-NZ" dirty="0" smtClean="0"/>
+              <a:t> – Victorian Country Fire Authority</a:t>
+            </a:r>
+          </a:p>
+          <a:p>
+            <a:pPr lvl="1"/>
+            <a:r>
+              <a:rPr lang="en-NZ" dirty="0" err="1" smtClean="0"/>
+              <a:t>LifeLink</a:t>
+            </a:r>
+            <a:r>
+              <a:rPr lang="en-NZ" dirty="0" smtClean="0"/>
+              <a:t> - Births, Deaths and Marriages State of NSW</a:t>
+            </a:r>
+          </a:p>
+          <a:p>
+            <a:pPr lvl="1"/>
+            <a:r>
+              <a:rPr lang="en-NZ" dirty="0" smtClean="0"/>
+              <a:t>…</a:t>
             </a:r>
           </a:p>
           <a:p>
@@ -12247,17 +12293,12 @@
               <a:rPr lang="en-NZ" dirty="0" smtClean="0"/>
               <a:t>Educator</a:t>
             </a:r>
-            <a:endParaRPr lang="en-NZ" dirty="0"/>
           </a:p>
           <a:p>
             <a:pPr lvl="1"/>
             <a:r>
-              <a:rPr lang="en-NZ" dirty="0" err="1" smtClean="0"/>
-              <a:t>Deakin</a:t>
-            </a:r>
-            <a:r>
-              <a:rPr lang="en-NZ" dirty="0" smtClean="0"/>
-              <a:t> </a:t>
+              <a:rPr lang="en-NZ" dirty="0" smtClean="0"/>
+              <a:t>Deakin </a:t>
             </a:r>
             <a:r>
               <a:rPr lang="en-NZ" dirty="0"/>
@@ -12285,7 +12326,7 @@
     </p:spTree>
     <p:extLst>
       <p:ext uri="{BB962C8B-B14F-4D97-AF65-F5344CB8AC3E}">
-        <p14:creationId xmlns:p14="http://schemas.microsoft.com/office/powerpoint/2010/main" val="2755129392"/>
+        <p14:creationId xmlns:p14="http://schemas.microsoft.com/office/powerpoint/2010/main" xmlns="" val="2755129392"/>
       </p:ext>
     </p:extLst>
   </p:cSld>
@@ -12809,7 +12850,7 @@
           <a:p>
             <a:r>
               <a:rPr lang="en-NZ" dirty="0" smtClean="0"/>
-              <a:t>Assessments</a:t>
+              <a:t>Technologies</a:t>
             </a:r>
             <a:endParaRPr lang="en-NZ" dirty="0"/>
           </a:p>
@@ -12828,64 +12869,74 @@
         <p:spPr/>
         <p:txBody>
           <a:bodyPr>
-            <a:normAutofit lnSpcReduction="10000"/>
+            <a:normAutofit fontScale="92500" lnSpcReduction="10000"/>
           </a:bodyPr>
           <a:lstStyle/>
           <a:p>
             <a:r>
               <a:rPr lang="en-NZ" dirty="0" smtClean="0"/>
-              <a:t>Lab Exercises: 30%</a:t>
+              <a:t>Java Server Faces</a:t>
             </a:r>
           </a:p>
           <a:p>
             <a:pPr lvl="1"/>
             <a:r>
               <a:rPr lang="en-NZ" dirty="0" smtClean="0"/>
-              <a:t>In class practical exercises due every week, can be submitted by email up to one week late.</a:t>
-            </a:r>
-          </a:p>
-          <a:p>
+              <a:t>Another Model View Controller framework</a:t>
+            </a:r>
+          </a:p>
+          <a:p>
+            <a:pPr lvl="1"/>
+            <a:r>
+              <a:rPr lang="en-NZ" dirty="0" smtClean="0"/>
+              <a:t>Component based and event oriented</a:t>
+            </a:r>
+          </a:p>
+          <a:p>
+            <a:pPr lvl="1"/>
+            <a:r>
+              <a:rPr lang="en-NZ" dirty="0" smtClean="0"/>
+              <a:t>Uses </a:t>
+            </a:r>
             <a:r>
               <a:rPr lang="en-NZ" dirty="0" err="1" smtClean="0"/>
-              <a:t>PeerWise</a:t>
-            </a:r>
-            <a:r>
-              <a:rPr lang="en-NZ" dirty="0" smtClean="0"/>
-              <a:t> Contribution: 10%</a:t>
+              <a:t>Facelets</a:t>
+            </a:r>
+            <a:r>
+              <a:rPr lang="en-NZ" dirty="0" smtClean="0"/>
+              <a:t> which is another presentation tech (similar to JSP)</a:t>
+            </a:r>
+          </a:p>
+          <a:p>
+            <a:r>
+              <a:rPr lang="en-NZ" dirty="0" smtClean="0"/>
+              <a:t>Hibernate</a:t>
             </a:r>
           </a:p>
           <a:p>
             <a:pPr lvl="1"/>
             <a:r>
               <a:rPr lang="en-NZ" dirty="0" smtClean="0"/>
-              <a:t>Online question / answer forum</a:t>
-            </a:r>
-          </a:p>
-          <a:p>
-            <a:r>
-              <a:rPr lang="en-NZ" dirty="0" smtClean="0"/>
-              <a:t>Assignment: 35%</a:t>
+              <a:t>Object-Relational Mapping between code and database</a:t>
             </a:r>
           </a:p>
           <a:p>
             <a:pPr lvl="1"/>
             <a:r>
               <a:rPr lang="en-NZ" dirty="0" smtClean="0"/>
-              <a:t>Two major assignments</a:t>
-            </a:r>
-          </a:p>
-          <a:p>
-            <a:r>
-              <a:rPr lang="en-NZ" dirty="0" smtClean="0"/>
-              <a:t>Final exam: 25%</a:t>
+              <a:t>Auto generates code and database mappings based on either class files or database schema</a:t>
             </a:r>
           </a:p>
           <a:p>
             <a:pPr lvl="1"/>
             <a:r>
               <a:rPr lang="en-NZ" dirty="0" smtClean="0"/>
-              <a:t>Code and theory</a:t>
-            </a:r>
+              <a:t>Saves lots of time as you do not have to embed SQL in your application</a:t>
+            </a:r>
+          </a:p>
+          <a:p>
+            <a:pPr lvl="1"/>
+            <a:endParaRPr lang="en-NZ" dirty="0"/>
           </a:p>
         </p:txBody>
       </p:sp>
@@ -12894,6 +12945,13 @@
   <p:clrMapOvr>
     <a:masterClrMapping/>
   </p:clrMapOvr>
+  <p:timing>
+    <p:tnLst>
+      <p:par>
+        <p:cTn id="1" dur="indefinite" restart="never" nodeType="tmRoot"/>
+      </p:par>
+    </p:tnLst>
+  </p:timing>
 </p:sld>
 </file>
 

</xml_diff>